<commit_message>
edit works cited slide
</commit_message>
<xml_diff>
--- a/main.pptx
+++ b/main.pptx
@@ -14,6 +14,8 @@
     <p:sldId id="262" r:id="rId8"/>
     <p:sldId id="263" r:id="rId9"/>
     <p:sldId id="264" r:id="rId10"/>
+    <p:sldId id="265" r:id="rId11"/>
+    <p:sldId id="266" r:id="rId12"/>
   </p:sldIdLst>
   <p:sldSz cx="9144000" cy="5143500" type="screen16x9"/>
   <p:notesSz cx="6858000" cy="9144000"/>
@@ -3190,6 +3192,182 @@
 </p:sld>
 </file>
 
+<file path=ppt/slides/slide10.xml><?xml version="1.0" encoding="utf-8"?>
+<p:sld xmlns:a="http://schemas.openxmlformats.org/drawingml/2006/main" xmlns:r="http://schemas.openxmlformats.org/officeDocument/2006/relationships" xmlns:p="http://schemas.openxmlformats.org/presentationml/2006/main">
+  <p:cSld>
+    <p:spTree>
+      <p:nvGrpSpPr>
+        <p:cNvPr id="1" name=""/>
+        <p:cNvGrpSpPr/>
+        <p:nvPr/>
+      </p:nvGrpSpPr>
+      <p:grpSpPr>
+        <a:xfrm>
+          <a:off x="0" y="0"/>
+          <a:ext cx="0" cy="0"/>
+          <a:chOff x="0" y="0"/>
+          <a:chExt cx="0" cy="0"/>
+        </a:xfrm>
+      </p:grpSpPr>
+      <p:sp>
+        <p:nvSpPr>
+          <p:cNvPr id="2" name="Title 1"/>
+          <p:cNvSpPr>
+            <a:spLocks noGrp="1"/>
+          </p:cNvSpPr>
+          <p:nvPr>
+            <p:ph type="title"/>
+          </p:nvPr>
+        </p:nvSpPr>
+        <p:spPr/>
+        <p:txBody>
+          <a:bodyPr/>
+          <a:lstStyle/>
+          <a:p>
+            <a:pPr lvl="0" indent="0" marL="0">
+              <a:buNone/>
+            </a:pPr>
+            <a:r>
+              <a:rPr/>
+              <a:t>Australia results</a:t>
+            </a:r>
+          </a:p>
+        </p:txBody>
+      </p:sp>
+      <p:pic>
+        <p:nvPicPr>
+          <p:cNvPr descr="main_files/figure-pptx/unnamed-chunk-3-1.png" id="0" name="Picture 1"/>
+          <p:cNvPicPr>
+            <a:picLocks noGrp="1" noChangeAspect="1"/>
+          </p:cNvPicPr>
+          <p:nvPr/>
+        </p:nvPicPr>
+        <p:blipFill>
+          <a:blip r:embed="rId2"/>
+          <a:stretch>
+            <a:fillRect/>
+          </a:stretch>
+        </p:blipFill>
+        <p:spPr bwMode="auto">
+          <a:xfrm>
+            <a:off x="2451100" y="1193800"/>
+            <a:ext cx="4241800" cy="3390900"/>
+          </a:xfrm>
+          <a:prstGeom prst="rect">
+            <a:avLst/>
+          </a:prstGeom>
+          <a:noFill/>
+          <a:ln w="9525">
+            <a:noFill/>
+            <a:headEnd/>
+            <a:tailEnd/>
+          </a:ln>
+        </p:spPr>
+      </p:pic>
+    </p:spTree>
+  </p:cSld>
+</p:sld>
+</file>
+
+<file path=ppt/slides/slide11.xml><?xml version="1.0" encoding="utf-8"?>
+<p:sld xmlns:a="http://schemas.openxmlformats.org/drawingml/2006/main" xmlns:r="http://schemas.openxmlformats.org/officeDocument/2006/relationships" xmlns:p="http://schemas.openxmlformats.org/presentationml/2006/main">
+  <p:cSld>
+    <p:spTree>
+      <p:nvGrpSpPr>
+        <p:cNvPr id="1" name=""/>
+        <p:cNvGrpSpPr/>
+        <p:nvPr/>
+      </p:nvGrpSpPr>
+      <p:grpSpPr>
+        <a:xfrm>
+          <a:off x="0" y="0"/>
+          <a:ext cx="0" cy="0"/>
+          <a:chOff x="0" y="0"/>
+          <a:chExt cx="0" cy="0"/>
+        </a:xfrm>
+      </p:grpSpPr>
+      <p:sp>
+        <p:nvSpPr>
+          <p:cNvPr id="2" name="Title 1"/>
+          <p:cNvSpPr>
+            <a:spLocks noGrp="1"/>
+          </p:cNvSpPr>
+          <p:nvPr>
+            <p:ph type="title"/>
+          </p:nvPr>
+        </p:nvSpPr>
+        <p:spPr/>
+        <p:txBody>
+          <a:bodyPr/>
+          <a:lstStyle/>
+          <a:p>
+            <a:pPr lvl="0" indent="0" marL="0">
+              <a:buNone/>
+            </a:pPr>
+            <a:r>
+              <a:rPr/>
+              <a:t>Works Cited</a:t>
+            </a:r>
+          </a:p>
+        </p:txBody>
+      </p:sp>
+      <p:sp>
+        <p:nvSpPr>
+          <p:cNvPr id="3" name="Content Placeholder 2"/>
+          <p:cNvSpPr>
+            <a:spLocks noGrp="1"/>
+          </p:cNvSpPr>
+          <p:nvPr>
+            <p:ph idx="1"/>
+          </p:nvPr>
+        </p:nvSpPr>
+        <p:spPr/>
+        <p:txBody>
+          <a:bodyPr/>
+          <a:lstStyle/>
+          <a:p>
+            <a:pPr lvl="0"/>
+            <a:r>
+              <a:rPr/>
+              <a:t>Link to study:</a:t>
+            </a:r>
+          </a:p>
+          <a:p>
+            <a:pPr lvl="0"/>
+            <a:r>
+              <a:rPr/>
+              <a:t>I. Ciufolini, A. Paolozzi, Prediction of the time evolution of the Covid-19 Pandemic in Italy by a Gauss Error Function and Monte Carlo simulations. Submitted to BioRxiv on 03.26.2020 and transferred on 03.27.2020 to MedRxiv. </a:t>
+            </a:r>
+            <a:r>
+              <a:rPr>
+                <a:hlinkClick r:id="rId2"/>
+              </a:rPr>
+              <a:t>https://doi.org/10.1101/2020.03.27.20045104</a:t>
+            </a:r>
+          </a:p>
+          <a:p>
+            <a:pPr lvl="0"/>
+            <a:r>
+              <a:rPr/>
+              <a:t>Link to covid data:</a:t>
+            </a:r>
+          </a:p>
+          <a:p>
+            <a:pPr lvl="0"/>
+            <a:r>
+              <a:rPr>
+                <a:hlinkClick r:id="rId3"/>
+              </a:rPr>
+              <a:t>https://covid19.who.int/</a:t>
+            </a:r>
+          </a:p>
+        </p:txBody>
+      </p:sp>
+    </p:spTree>
+  </p:cSld>
+</p:sld>
+</file>
+
 <file path=ppt/slides/slide2.xml><?xml version="1.0" encoding="utf-8"?>
 <p:sld xmlns:a="http://schemas.openxmlformats.org/drawingml/2006/main" xmlns:r="http://schemas.openxmlformats.org/officeDocument/2006/relationships" xmlns:p="http://schemas.openxmlformats.org/presentationml/2006/main">
   <p:cSld>
@@ -3448,7 +3626,7 @@
             </a:pPr>
             <a:r>
               <a:rPr/>
-              <a:t>Australia Simulation</a:t>
+              <a:t>China Simulation</a:t>
             </a:r>
           </a:p>
         </p:txBody>
@@ -3459,6 +3637,250 @@
 </file>
 
 <file path=ppt/slides/slide5.xml><?xml version="1.0" encoding="utf-8"?>
+<p:sld xmlns:a="http://schemas.openxmlformats.org/drawingml/2006/main" xmlns:r="http://schemas.openxmlformats.org/officeDocument/2006/relationships" xmlns:p="http://schemas.openxmlformats.org/presentationml/2006/main">
+  <p:cSld>
+    <p:spTree>
+      <p:nvGrpSpPr>
+        <p:cNvPr id="1" name=""/>
+        <p:cNvGrpSpPr/>
+        <p:nvPr/>
+      </p:nvGrpSpPr>
+      <p:grpSpPr>
+        <a:xfrm>
+          <a:off x="0" y="0"/>
+          <a:ext cx="0" cy="0"/>
+          <a:chOff x="0" y="0"/>
+          <a:chExt cx="0" cy="0"/>
+        </a:xfrm>
+      </p:grpSpPr>
+      <p:sp>
+        <p:nvSpPr>
+          <p:cNvPr id="2" name="Title 1"/>
+          <p:cNvSpPr>
+            <a:spLocks noGrp="1"/>
+          </p:cNvSpPr>
+          <p:nvPr>
+            <p:ph type="title"/>
+          </p:nvPr>
+        </p:nvSpPr>
+        <p:spPr/>
+        <p:txBody>
+          <a:bodyPr/>
+          <a:lstStyle/>
+          <a:p>
+            <a:pPr lvl="0" indent="0" marL="0">
+              <a:buNone/>
+            </a:pPr>
+            <a:r>
+              <a:rPr/>
+              <a:t>China Simulation</a:t>
+            </a:r>
+          </a:p>
+        </p:txBody>
+      </p:sp>
+      <p:sp>
+        <p:nvSpPr>
+          <p:cNvPr id="3" name="Content Placeholder 2"/>
+          <p:cNvSpPr>
+            <a:spLocks noGrp="1"/>
+          </p:cNvSpPr>
+          <p:nvPr>
+            <p:ph idx="1"/>
+          </p:nvPr>
+        </p:nvSpPr>
+        <p:spPr/>
+        <p:txBody>
+          <a:bodyPr/>
+          <a:lstStyle/>
+          <a:p>
+            <a:pPr lvl="0"/>
+            <a:r>
+              <a:rPr/>
+              <a:t>Add stuff here</a:t>
+            </a:r>
+          </a:p>
+        </p:txBody>
+      </p:sp>
+    </p:spTree>
+  </p:cSld>
+</p:sld>
+</file>
+
+<file path=ppt/slides/slide6.xml><?xml version="1.0" encoding="utf-8"?>
+<p:sld xmlns:a="http://schemas.openxmlformats.org/drawingml/2006/main" xmlns:r="http://schemas.openxmlformats.org/officeDocument/2006/relationships" xmlns:p="http://schemas.openxmlformats.org/presentationml/2006/main">
+  <p:cSld>
+    <p:spTree>
+      <p:nvGrpSpPr>
+        <p:cNvPr id="1" name=""/>
+        <p:cNvGrpSpPr/>
+        <p:nvPr/>
+      </p:nvGrpSpPr>
+      <p:grpSpPr>
+        <a:xfrm>
+          <a:off x="0" y="0"/>
+          <a:ext cx="0" cy="0"/>
+          <a:chOff x="0" y="0"/>
+          <a:chExt cx="0" cy="0"/>
+        </a:xfrm>
+      </p:grpSpPr>
+      <p:sp>
+        <p:nvSpPr>
+          <p:cNvPr id="2" name="Title 1"/>
+          <p:cNvSpPr>
+            <a:spLocks noGrp="1"/>
+          </p:cNvSpPr>
+          <p:nvPr>
+            <p:ph type="title"/>
+          </p:nvPr>
+        </p:nvSpPr>
+        <p:spPr>
+          <a:xfrm>
+            <a:off x="722313" y="3305176"/>
+            <a:ext cx="7772400" cy="1021556"/>
+          </a:xfrm>
+        </p:spPr>
+        <p:txBody>
+          <a:bodyPr/>
+          <a:lstStyle/>
+          <a:p>
+            <a:pPr lvl="0" indent="0" marL="0">
+              <a:buNone/>
+            </a:pPr>
+            <a:r>
+              <a:rPr/>
+              <a:t>Italy Simulation</a:t>
+            </a:r>
+          </a:p>
+        </p:txBody>
+      </p:sp>
+    </p:spTree>
+  </p:cSld>
+</p:sld>
+</file>
+
+<file path=ppt/slides/slide7.xml><?xml version="1.0" encoding="utf-8"?>
+<p:sld xmlns:a="http://schemas.openxmlformats.org/drawingml/2006/main" xmlns:r="http://schemas.openxmlformats.org/officeDocument/2006/relationships" xmlns:p="http://schemas.openxmlformats.org/presentationml/2006/main">
+  <p:cSld>
+    <p:spTree>
+      <p:nvGrpSpPr>
+        <p:cNvPr id="1" name=""/>
+        <p:cNvGrpSpPr/>
+        <p:nvPr/>
+      </p:nvGrpSpPr>
+      <p:grpSpPr>
+        <a:xfrm>
+          <a:off x="0" y="0"/>
+          <a:ext cx="0" cy="0"/>
+          <a:chOff x="0" y="0"/>
+          <a:chExt cx="0" cy="0"/>
+        </a:xfrm>
+      </p:grpSpPr>
+      <p:sp>
+        <p:nvSpPr>
+          <p:cNvPr id="2" name="Title 1"/>
+          <p:cNvSpPr>
+            <a:spLocks noGrp="1"/>
+          </p:cNvSpPr>
+          <p:nvPr>
+            <p:ph type="title"/>
+          </p:nvPr>
+        </p:nvSpPr>
+        <p:spPr/>
+        <p:txBody>
+          <a:bodyPr/>
+          <a:lstStyle/>
+          <a:p>
+            <a:pPr lvl="0" indent="0" marL="0">
+              <a:buNone/>
+            </a:pPr>
+            <a:r>
+              <a:rPr/>
+              <a:t>Italy Simulation</a:t>
+            </a:r>
+          </a:p>
+        </p:txBody>
+      </p:sp>
+      <p:sp>
+        <p:nvSpPr>
+          <p:cNvPr id="3" name="Content Placeholder 2"/>
+          <p:cNvSpPr>
+            <a:spLocks noGrp="1"/>
+          </p:cNvSpPr>
+          <p:nvPr>
+            <p:ph idx="1"/>
+          </p:nvPr>
+        </p:nvSpPr>
+        <p:spPr/>
+        <p:txBody>
+          <a:bodyPr/>
+          <a:lstStyle/>
+          <a:p>
+            <a:pPr lvl="0"/>
+            <a:r>
+              <a:rPr/>
+              <a:t>Add stuff here</a:t>
+            </a:r>
+          </a:p>
+        </p:txBody>
+      </p:sp>
+    </p:spTree>
+  </p:cSld>
+</p:sld>
+</file>
+
+<file path=ppt/slides/slide8.xml><?xml version="1.0" encoding="utf-8"?>
+<p:sld xmlns:a="http://schemas.openxmlformats.org/drawingml/2006/main" xmlns:r="http://schemas.openxmlformats.org/officeDocument/2006/relationships" xmlns:p="http://schemas.openxmlformats.org/presentationml/2006/main">
+  <p:cSld>
+    <p:spTree>
+      <p:nvGrpSpPr>
+        <p:cNvPr id="1" name=""/>
+        <p:cNvGrpSpPr/>
+        <p:nvPr/>
+      </p:nvGrpSpPr>
+      <p:grpSpPr>
+        <a:xfrm>
+          <a:off x="0" y="0"/>
+          <a:ext cx="0" cy="0"/>
+          <a:chOff x="0" y="0"/>
+          <a:chExt cx="0" cy="0"/>
+        </a:xfrm>
+      </p:grpSpPr>
+      <p:sp>
+        <p:nvSpPr>
+          <p:cNvPr id="2" name="Title 1"/>
+          <p:cNvSpPr>
+            <a:spLocks noGrp="1"/>
+          </p:cNvSpPr>
+          <p:nvPr>
+            <p:ph type="title"/>
+          </p:nvPr>
+        </p:nvSpPr>
+        <p:spPr>
+          <a:xfrm>
+            <a:off x="722313" y="3305176"/>
+            <a:ext cx="7772400" cy="1021556"/>
+          </a:xfrm>
+        </p:spPr>
+        <p:txBody>
+          <a:bodyPr/>
+          <a:lstStyle/>
+          <a:p>
+            <a:pPr lvl="0" indent="0" marL="0">
+              <a:buNone/>
+            </a:pPr>
+            <a:r>
+              <a:rPr/>
+              <a:t>Australia Simulation</a:t>
+            </a:r>
+          </a:p>
+        </p:txBody>
+      </p:sp>
+    </p:spTree>
+  </p:cSld>
+</p:sld>
+</file>
+
+<file path=ppt/slides/slide9.xml><?xml version="1.0" encoding="utf-8"?>
 <p:sld xmlns:a="http://schemas.openxmlformats.org/drawingml/2006/main" xmlns:r="http://schemas.openxmlformats.org/officeDocument/2006/relationships" xmlns:p="http://schemas.openxmlformats.org/presentationml/2006/main">
   <p:cSld>
     <p:spTree>
@@ -3530,300 +3952,6 @@
           </a:ln>
         </p:spPr>
       </p:pic>
-    </p:spTree>
-  </p:cSld>
-</p:sld>
-</file>
-
-<file path=ppt/slides/slide6.xml><?xml version="1.0" encoding="utf-8"?>
-<p:sld xmlns:a="http://schemas.openxmlformats.org/drawingml/2006/main" xmlns:r="http://schemas.openxmlformats.org/officeDocument/2006/relationships" xmlns:p="http://schemas.openxmlformats.org/presentationml/2006/main">
-  <p:cSld>
-    <p:spTree>
-      <p:nvGrpSpPr>
-        <p:cNvPr id="1" name=""/>
-        <p:cNvGrpSpPr/>
-        <p:nvPr/>
-      </p:nvGrpSpPr>
-      <p:grpSpPr>
-        <a:xfrm>
-          <a:off x="0" y="0"/>
-          <a:ext cx="0" cy="0"/>
-          <a:chOff x="0" y="0"/>
-          <a:chExt cx="0" cy="0"/>
-        </a:xfrm>
-      </p:grpSpPr>
-      <p:sp>
-        <p:nvSpPr>
-          <p:cNvPr id="2" name="Title 1"/>
-          <p:cNvSpPr>
-            <a:spLocks noGrp="1"/>
-          </p:cNvSpPr>
-          <p:nvPr>
-            <p:ph type="title"/>
-          </p:nvPr>
-        </p:nvSpPr>
-        <p:spPr/>
-        <p:txBody>
-          <a:bodyPr/>
-          <a:lstStyle/>
-          <a:p>
-            <a:pPr lvl="0" indent="0" marL="0">
-              <a:buNone/>
-            </a:pPr>
-            <a:r>
-              <a:rPr/>
-              <a:t>Australia results</a:t>
-            </a:r>
-          </a:p>
-        </p:txBody>
-      </p:sp>
-      <p:pic>
-        <p:nvPicPr>
-          <p:cNvPr descr="main_files/figure-pptx/unnamed-chunk-3-1.png" id="0" name="Picture 1"/>
-          <p:cNvPicPr>
-            <a:picLocks noGrp="1" noChangeAspect="1"/>
-          </p:cNvPicPr>
-          <p:nvPr/>
-        </p:nvPicPr>
-        <p:blipFill>
-          <a:blip r:embed="rId2"/>
-          <a:stretch>
-            <a:fillRect/>
-          </a:stretch>
-        </p:blipFill>
-        <p:spPr bwMode="auto">
-          <a:xfrm>
-            <a:off x="2451100" y="1193800"/>
-            <a:ext cx="4241800" cy="3390900"/>
-          </a:xfrm>
-          <a:prstGeom prst="rect">
-            <a:avLst/>
-          </a:prstGeom>
-          <a:noFill/>
-          <a:ln w="9525">
-            <a:noFill/>
-            <a:headEnd/>
-            <a:tailEnd/>
-          </a:ln>
-        </p:spPr>
-      </p:pic>
-    </p:spTree>
-  </p:cSld>
-</p:sld>
-</file>
-
-<file path=ppt/slides/slide7.xml><?xml version="1.0" encoding="utf-8"?>
-<p:sld xmlns:a="http://schemas.openxmlformats.org/drawingml/2006/main" xmlns:r="http://schemas.openxmlformats.org/officeDocument/2006/relationships" xmlns:p="http://schemas.openxmlformats.org/presentationml/2006/main">
-  <p:cSld>
-    <p:spTree>
-      <p:nvGrpSpPr>
-        <p:cNvPr id="1" name=""/>
-        <p:cNvGrpSpPr/>
-        <p:nvPr/>
-      </p:nvGrpSpPr>
-      <p:grpSpPr>
-        <a:xfrm>
-          <a:off x="0" y="0"/>
-          <a:ext cx="0" cy="0"/>
-          <a:chOff x="0" y="0"/>
-          <a:chExt cx="0" cy="0"/>
-        </a:xfrm>
-      </p:grpSpPr>
-      <p:sp>
-        <p:nvSpPr>
-          <p:cNvPr id="2" name="Title 1"/>
-          <p:cNvSpPr>
-            <a:spLocks noGrp="1"/>
-          </p:cNvSpPr>
-          <p:nvPr>
-            <p:ph type="title"/>
-          </p:nvPr>
-        </p:nvSpPr>
-        <p:spPr/>
-        <p:txBody>
-          <a:bodyPr/>
-          <a:lstStyle/>
-          <a:p>
-            <a:pPr lvl="0" indent="0" marL="0">
-              <a:buNone/>
-            </a:pPr>
-            <a:r>
-              <a:rPr/>
-              <a:t>Italy Simulation</a:t>
-            </a:r>
-          </a:p>
-        </p:txBody>
-      </p:sp>
-      <p:sp>
-        <p:nvSpPr>
-          <p:cNvPr id="3" name="Content Placeholder 2"/>
-          <p:cNvSpPr>
-            <a:spLocks noGrp="1"/>
-          </p:cNvSpPr>
-          <p:nvPr>
-            <p:ph idx="1"/>
-          </p:nvPr>
-        </p:nvSpPr>
-        <p:spPr/>
-        <p:txBody>
-          <a:bodyPr/>
-          <a:lstStyle/>
-          <a:p>
-            <a:pPr lvl="0"/>
-            <a:r>
-              <a:rPr/>
-              <a:t>Add stuff here</a:t>
-            </a:r>
-          </a:p>
-        </p:txBody>
-      </p:sp>
-    </p:spTree>
-  </p:cSld>
-</p:sld>
-</file>
-
-<file path=ppt/slides/slide8.xml><?xml version="1.0" encoding="utf-8"?>
-<p:sld xmlns:a="http://schemas.openxmlformats.org/drawingml/2006/main" xmlns:r="http://schemas.openxmlformats.org/officeDocument/2006/relationships" xmlns:p="http://schemas.openxmlformats.org/presentationml/2006/main">
-  <p:cSld>
-    <p:spTree>
-      <p:nvGrpSpPr>
-        <p:cNvPr id="1" name=""/>
-        <p:cNvGrpSpPr/>
-        <p:nvPr/>
-      </p:nvGrpSpPr>
-      <p:grpSpPr>
-        <a:xfrm>
-          <a:off x="0" y="0"/>
-          <a:ext cx="0" cy="0"/>
-          <a:chOff x="0" y="0"/>
-          <a:chExt cx="0" cy="0"/>
-        </a:xfrm>
-      </p:grpSpPr>
-      <p:sp>
-        <p:nvSpPr>
-          <p:cNvPr id="2" name="Title 1"/>
-          <p:cNvSpPr>
-            <a:spLocks noGrp="1"/>
-          </p:cNvSpPr>
-          <p:nvPr>
-            <p:ph type="title"/>
-          </p:nvPr>
-        </p:nvSpPr>
-        <p:spPr/>
-        <p:txBody>
-          <a:bodyPr/>
-          <a:lstStyle/>
-          <a:p>
-            <a:pPr lvl="0" indent="0" marL="0">
-              <a:buNone/>
-            </a:pPr>
-            <a:r>
-              <a:rPr/>
-              <a:t>(Fill in Here) Simulation</a:t>
-            </a:r>
-          </a:p>
-        </p:txBody>
-      </p:sp>
-      <p:sp>
-        <p:nvSpPr>
-          <p:cNvPr id="3" name="Content Placeholder 2"/>
-          <p:cNvSpPr>
-            <a:spLocks noGrp="1"/>
-          </p:cNvSpPr>
-          <p:nvPr>
-            <p:ph idx="1"/>
-          </p:nvPr>
-        </p:nvSpPr>
-        <p:spPr/>
-        <p:txBody>
-          <a:bodyPr/>
-          <a:lstStyle/>
-          <a:p>
-            <a:pPr lvl="0"/>
-            <a:r>
-              <a:rPr/>
-              <a:t>Add stuff here</a:t>
-            </a:r>
-          </a:p>
-        </p:txBody>
-      </p:sp>
-    </p:spTree>
-  </p:cSld>
-</p:sld>
-</file>
-
-<file path=ppt/slides/slide9.xml><?xml version="1.0" encoding="utf-8"?>
-<p:sld xmlns:a="http://schemas.openxmlformats.org/drawingml/2006/main" xmlns:r="http://schemas.openxmlformats.org/officeDocument/2006/relationships" xmlns:p="http://schemas.openxmlformats.org/presentationml/2006/main">
-  <p:cSld>
-    <p:spTree>
-      <p:nvGrpSpPr>
-        <p:cNvPr id="1" name=""/>
-        <p:cNvGrpSpPr/>
-        <p:nvPr/>
-      </p:nvGrpSpPr>
-      <p:grpSpPr>
-        <a:xfrm>
-          <a:off x="0" y="0"/>
-          <a:ext cx="0" cy="0"/>
-          <a:chOff x="0" y="0"/>
-          <a:chExt cx="0" cy="0"/>
-        </a:xfrm>
-      </p:grpSpPr>
-      <p:sp>
-        <p:nvSpPr>
-          <p:cNvPr id="2" name="Title 1"/>
-          <p:cNvSpPr>
-            <a:spLocks noGrp="1"/>
-          </p:cNvSpPr>
-          <p:nvPr>
-            <p:ph type="title"/>
-          </p:nvPr>
-        </p:nvSpPr>
-        <p:spPr/>
-        <p:txBody>
-          <a:bodyPr/>
-          <a:lstStyle/>
-          <a:p>
-            <a:pPr lvl="0" indent="0" marL="0">
-              <a:buNone/>
-            </a:pPr>
-            <a:r>
-              <a:rPr/>
-              <a:t>Works Cited</a:t>
-            </a:r>
-          </a:p>
-        </p:txBody>
-      </p:sp>
-      <p:sp>
-        <p:nvSpPr>
-          <p:cNvPr id="3" name="Content Placeholder 2"/>
-          <p:cNvSpPr>
-            <a:spLocks noGrp="1"/>
-          </p:cNvSpPr>
-          <p:nvPr>
-            <p:ph idx="1"/>
-          </p:nvPr>
-        </p:nvSpPr>
-        <p:spPr/>
-        <p:txBody>
-          <a:bodyPr/>
-          <a:lstStyle/>
-          <a:p>
-            <a:pPr lvl="0"/>
-            <a:r>
-              <a:rPr/>
-              <a:t>Add link to study here</a:t>
-            </a:r>
-          </a:p>
-          <a:p>
-            <a:pPr lvl="0"/>
-            <a:r>
-              <a:rPr/>
-              <a:t>Add link to covid data here</a:t>
-            </a:r>
-          </a:p>
-        </p:txBody>
-      </p:sp>
     </p:spTree>
   </p:cSld>
 </p:sld>

</xml_diff>

<commit_message>
Adjusted introduction and formatted the plots
</commit_message>
<xml_diff>
--- a/main.pptx
+++ b/main.pptx
@@ -32,6 +32,9 @@
     <p:sldId id="280" r:id="rId26"/>
     <p:sldId id="281" r:id="rId27"/>
     <p:sldId id="282" r:id="rId28"/>
+    <p:sldId id="283" r:id="rId29"/>
+    <p:sldId id="284" r:id="rId30"/>
+    <p:sldId id="285" r:id="rId31"/>
   </p:sldIdLst>
   <p:sldSz cx="9144000" cy="5143500" type="screen16x9"/>
   <p:notesSz cx="6858000" cy="9144000"/>
@@ -3235,7 +3238,12 @@
             <p:ph type="title"/>
           </p:nvPr>
         </p:nvSpPr>
-        <p:spPr/>
+        <p:spPr>
+          <a:xfrm>
+            <a:off x="722313" y="3305176"/>
+            <a:ext cx="7772400" cy="1021556"/>
+          </a:xfrm>
+        </p:spPr>
         <p:txBody>
           <a:bodyPr/>
           <a:lstStyle/>
@@ -3245,41 +3253,11 @@
             </a:pPr>
             <a:r>
               <a:rPr/>
-              <a:t>Fit by the Gauss Error Function and Peak Day (Positive Cases)</a:t>
-            </a:r>
-          </a:p>
-        </p:txBody>
-      </p:sp>
-      <p:pic>
-        <p:nvPicPr>
-          <p:cNvPr descr="main_files/figure-pptx/unnamed-chunk-7-1.png" id="0" name="Picture 1"/>
-          <p:cNvPicPr>
-            <a:picLocks noGrp="1" noChangeAspect="1"/>
-          </p:cNvPicPr>
-          <p:nvPr/>
-        </p:nvPicPr>
-        <p:blipFill>
-          <a:blip r:embed="rId2"/>
-          <a:stretch>
-            <a:fillRect/>
-          </a:stretch>
-        </p:blipFill>
-        <p:spPr bwMode="auto">
-          <a:xfrm>
-            <a:off x="2032000" y="1193800"/>
-            <a:ext cx="5080000" cy="3390900"/>
-          </a:xfrm>
-          <a:prstGeom prst="rect">
-            <a:avLst/>
-          </a:prstGeom>
-          <a:noFill/>
-          <a:ln w="9525">
-            <a:noFill/>
-            <a:headEnd/>
-            <a:tailEnd/>
-          </a:ln>
-        </p:spPr>
-      </p:pic>
+              <a:t>Italy Simulation</a:t>
+            </a:r>
+          </a:p>
+        </p:txBody>
+      </p:sp>
     </p:spTree>
   </p:cSld>
 </p:sld>
@@ -3322,14 +3300,14 @@
             </a:pPr>
             <a:r>
               <a:rPr/>
-              <a:t>Fit by the Gauss Error Function and Peak Day (Fatalities)</a:t>
+              <a:t>Initial Data for Cases in Italy</a:t>
             </a:r>
           </a:p>
         </p:txBody>
       </p:sp>
       <p:pic>
         <p:nvPicPr>
-          <p:cNvPr descr="main_files/figure-pptx/unnamed-chunk-9-1.png" id="0" name="Picture 1"/>
+          <p:cNvPr descr="main_files/figure-pptx/unnamed-chunk-10-1.png" id="0" name="Picture 1"/>
           <p:cNvPicPr>
             <a:picLocks noGrp="1" noChangeAspect="1"/>
           </p:cNvPicPr>
@@ -3389,26 +3367,51 @@
             <p:ph type="title"/>
           </p:nvPr>
         </p:nvSpPr>
-        <p:spPr>
+        <p:spPr/>
+        <p:txBody>
+          <a:bodyPr/>
+          <a:lstStyle/>
+          <a:p>
+            <a:pPr lvl="0" indent="0" marL="0">
+              <a:buNone/>
+            </a:pPr>
+            <a:r>
+              <a:rPr/>
+              <a:t>Initial Data for Fatalities in Italy</a:t>
+            </a:r>
+          </a:p>
+        </p:txBody>
+      </p:sp>
+      <p:pic>
+        <p:nvPicPr>
+          <p:cNvPr descr="main_files/figure-pptx/unnamed-chunk-11-1.png" id="0" name="Picture 1"/>
+          <p:cNvPicPr>
+            <a:picLocks noGrp="1" noChangeAspect="1"/>
+          </p:cNvPicPr>
+          <p:nvPr/>
+        </p:nvPicPr>
+        <p:blipFill>
+          <a:blip r:embed="rId2"/>
+          <a:stretch>
+            <a:fillRect/>
+          </a:stretch>
+        </p:blipFill>
+        <p:spPr bwMode="auto">
           <a:xfrm>
-            <a:off x="722313" y="3305176"/>
-            <a:ext cx="7772400" cy="1021556"/>
+            <a:off x="2032000" y="1193800"/>
+            <a:ext cx="5080000" cy="3390900"/>
           </a:xfrm>
+          <a:prstGeom prst="rect">
+            <a:avLst/>
+          </a:prstGeom>
+          <a:noFill/>
+          <a:ln w="9525">
+            <a:noFill/>
+            <a:headEnd/>
+            <a:tailEnd/>
+          </a:ln>
         </p:spPr>
-        <p:txBody>
-          <a:bodyPr/>
-          <a:lstStyle/>
-          <a:p>
-            <a:pPr lvl="0" indent="0" marL="0">
-              <a:buNone/>
-            </a:pPr>
-            <a:r>
-              <a:rPr/>
-              <a:t>Italy Simulation</a:t>
-            </a:r>
-          </a:p>
-        </p:txBody>
-      </p:sp>
+      </p:pic>
     </p:spTree>
   </p:cSld>
 </p:sld>
@@ -3451,14 +3454,14 @@
             </a:pPr>
             <a:r>
               <a:rPr/>
-              <a:t>Plot of Diagnosed Positive Cases</a:t>
+              <a:t>Fitting Gauss Error Function to Positive Cases in Italy</a:t>
             </a:r>
           </a:p>
         </p:txBody>
       </p:sp>
       <p:pic>
         <p:nvPicPr>
-          <p:cNvPr descr="main_files/figure-pptx/unnamed-chunk-10-1.png" id="0" name="Picture 1"/>
+          <p:cNvPr descr="main_files/figure-pptx/unnamed-chunk-12-1.png" id="0" name="Picture 1"/>
           <p:cNvPicPr>
             <a:picLocks noGrp="1" noChangeAspect="1"/>
           </p:cNvPicPr>
@@ -3528,14 +3531,14 @@
             </a:pPr>
             <a:r>
               <a:rPr/>
-              <a:t>Plot of Fatalities</a:t>
+              <a:t>Fitting Gauss Error Function to Fatalities in Italy</a:t>
             </a:r>
           </a:p>
         </p:txBody>
       </p:sp>
       <p:pic>
         <p:nvPicPr>
-          <p:cNvPr descr="main_files/figure-pptx/unnamed-chunk-11-1.png" id="0" name="Picture 1"/>
+          <p:cNvPr descr="main_files/figure-pptx/unnamed-chunk-13-1.png" id="0" name="Picture 1"/>
           <p:cNvPicPr>
             <a:picLocks noGrp="1" noChangeAspect="1"/>
           </p:cNvPicPr>
@@ -3605,41 +3608,97 @@
             </a:pPr>
             <a:r>
               <a:rPr/>
-              <a:t>Plot of Diagnosed Positive Cases with Gauss Error Function</a:t>
-            </a:r>
-          </a:p>
-        </p:txBody>
-      </p:sp>
-      <p:pic>
-        <p:nvPicPr>
-          <p:cNvPr descr="main_files/figure-pptx/unnamed-chunk-12-1.png" id="0" name="Picture 1"/>
-          <p:cNvPicPr>
-            <a:picLocks noGrp="1" noChangeAspect="1"/>
-          </p:cNvPicPr>
-          <p:nvPr/>
-        </p:nvPicPr>
-        <p:blipFill>
-          <a:blip r:embed="rId2"/>
-          <a:stretch>
-            <a:fillRect/>
-          </a:stretch>
-        </p:blipFill>
-        <p:spPr bwMode="auto">
-          <a:xfrm>
-            <a:off x="2032000" y="1193800"/>
-            <a:ext cx="5080000" cy="3390900"/>
-          </a:xfrm>
-          <a:prstGeom prst="rect">
-            <a:avLst/>
-          </a:prstGeom>
-          <a:noFill/>
-          <a:ln w="9525">
-            <a:noFill/>
-            <a:headEnd/>
-            <a:tailEnd/>
-          </a:ln>
-        </p:spPr>
-      </p:pic>
+              <a:t>Overview of the Monte Carlo Simulation</a:t>
+            </a:r>
+          </a:p>
+        </p:txBody>
+      </p:sp>
+      <p:sp>
+        <p:nvSpPr>
+          <p:cNvPr id="3" name="Content Placeholder 2"/>
+          <p:cNvSpPr>
+            <a:spLocks noGrp="1"/>
+          </p:cNvSpPr>
+          <p:nvPr>
+            <p:ph idx="1"/>
+          </p:nvPr>
+        </p:nvSpPr>
+        <p:spPr/>
+        <p:txBody>
+          <a:bodyPr/>
+          <a:lstStyle/>
+          <a:p>
+            <a:pPr lvl="0"/>
+            <a:r>
+              <a:rPr/>
+              <a:t>create a random matrix : m X n</a:t>
+            </a:r>
+          </a:p>
+          <a:p>
+            <a:pPr lvl="1"/>
+            <a:r>
+              <a:rPr/>
+              <a:t>m = number of random outcomes (</a:t>
+            </a:r>
+            <a:r>
+              <a:rPr i="1"/>
+              <a:t>chosen to be 150</a:t>
+            </a:r>
+            <a:r>
+              <a:rPr/>
+              <a:t>)</a:t>
+            </a:r>
+          </a:p>
+          <a:p>
+            <a:pPr lvl="1"/>
+            <a:r>
+              <a:rPr/>
+              <a:t>n = number of observed days (</a:t>
+            </a:r>
+            <a:r>
+              <a:rPr i="1"/>
+              <a:t>n = 1,…,j</a:t>
+            </a:r>
+            <a:r>
+              <a:rPr/>
+              <a:t>)</a:t>
+            </a:r>
+          </a:p>
+          <a:p>
+            <a:pPr lvl="0"/>
+            <a:r>
+              <a:rPr/>
+              <a:t>each # in the matrix is a Gaussian distribution with mean = 1 and sigma = 0.1</a:t>
+            </a:r>
+          </a:p>
+          <a:p>
+            <a:pPr lvl="1"/>
+            <a:r>
+              <a:rPr/>
+              <a:t>multiply each column (</a:t>
+            </a:r>
+            <a:r>
+              <a:rPr i="1"/>
+              <a:t>j</a:t>
+            </a:r>
+            <a:r>
+              <a:rPr/>
+              <a:t>) by the # of total cases (or deaths) that corresponds to each day </a:t>
+            </a:r>
+            <a:r>
+              <a:rPr i="1"/>
+              <a:t>j</a:t>
+            </a:r>
+          </a:p>
+          <a:p>
+            <a:pPr lvl="0"/>
+            <a:r>
+              <a:rPr/>
+              <a:t>add more…</a:t>
+            </a:r>
+          </a:p>
+        </p:txBody>
+      </p:sp>
     </p:spTree>
   </p:cSld>
 </p:sld>
@@ -3682,41 +3741,41 @@
             </a:pPr>
             <a:r>
               <a:rPr/>
-              <a:t>Plot of Fatalities with Gauss Error Function</a:t>
-            </a:r>
-          </a:p>
-        </p:txBody>
-      </p:sp>
-      <p:pic>
-        <p:nvPicPr>
-          <p:cNvPr descr="main_files/figure-pptx/unnamed-chunk-13-1.png" id="0" name="Picture 1"/>
-          <p:cNvPicPr>
-            <a:picLocks noGrp="1" noChangeAspect="1"/>
-          </p:cNvPicPr>
-          <p:nvPr/>
-        </p:nvPicPr>
-        <p:blipFill>
-          <a:blip r:embed="rId2"/>
-          <a:stretch>
-            <a:fillRect/>
-          </a:stretch>
-        </p:blipFill>
-        <p:spPr bwMode="auto">
-          <a:xfrm>
-            <a:off x="2032000" y="1193800"/>
-            <a:ext cx="5080000" cy="3390900"/>
-          </a:xfrm>
-          <a:prstGeom prst="rect">
-            <a:avLst/>
-          </a:prstGeom>
-          <a:noFill/>
-          <a:ln w="9525">
-            <a:noFill/>
-            <a:headEnd/>
-            <a:tailEnd/>
-          </a:ln>
-        </p:spPr>
-      </p:pic>
+              <a:t>Using MonteCarlo Simulation to predict the day of flex</a:t>
+            </a:r>
+          </a:p>
+        </p:txBody>
+      </p:sp>
+      <p:sp>
+        <p:nvSpPr>
+          <p:cNvPr id="3" name="Content Placeholder 2"/>
+          <p:cNvSpPr>
+            <a:spLocks noGrp="1"/>
+          </p:cNvSpPr>
+          <p:nvPr>
+            <p:ph idx="1"/>
+          </p:nvPr>
+        </p:nvSpPr>
+        <p:spPr/>
+        <p:txBody>
+          <a:bodyPr/>
+          <a:lstStyle/>
+          <a:p>
+            <a:pPr lvl="0"/>
+            <a:r>
+              <a:rPr/>
+              <a:t>The mean of the day of flex for cases is 40.59 days and the standard deviation is 5.222832 days.</a:t>
+            </a:r>
+          </a:p>
+          <a:p>
+            <a:pPr lvl="0"/>
+            <a:r>
+              <a:rPr/>
+              <a:t>The mean of the day of flex for fatalities is 43.46 days and the standard deviation is 5.228381 days.</a:t>
+            </a:r>
+          </a:p>
+        </p:txBody>
+      </p:sp>
     </p:spTree>
   </p:cSld>
 </p:sld>
@@ -3751,8 +3810,8 @@
         </p:nvSpPr>
         <p:spPr>
           <a:xfrm>
-            <a:off x="722313" y="3305176"/>
-            <a:ext cx="7772400" cy="1021556"/>
+            <a:off x="457201" y="204787"/>
+            <a:ext cx="3008313" cy="871538"/>
           </a:xfrm>
         </p:spPr>
         <p:txBody>
@@ -3764,11 +3823,66 @@
             </a:pPr>
             <a:r>
               <a:rPr/>
-              <a:t>Australia Simulation</a:t>
-            </a:r>
-          </a:p>
-        </p:txBody>
-      </p:sp>
+              <a:t>150 Monte Carlo simulations plotted</a:t>
+            </a:r>
+          </a:p>
+        </p:txBody>
+      </p:sp>
+      <p:sp>
+        <p:nvSpPr>
+          <p:cNvPr id="4" name="Text Placeholder 3"/>
+          <p:cNvSpPr>
+            <a:spLocks noGrp="1"/>
+          </p:cNvSpPr>
+          <p:nvPr>
+            <p:ph idx="2" sz="half" type="body"/>
+          </p:nvPr>
+        </p:nvSpPr>
+        <p:spPr/>
+        <p:txBody>
+          <a:bodyPr/>
+          <a:lstStyle/>
+          <a:p>
+            <a:pPr lvl="0" indent="0" marL="0">
+              <a:buNone/>
+            </a:pPr>
+            <a:r>
+              <a:rPr/>
+              <a:t>“Each red dot corresponds to the day of occurrence of the flex obtained with each of the 150 Monte Carlo simulations”</a:t>
+            </a:r>
+          </a:p>
+        </p:txBody>
+      </p:sp>
+      <p:pic>
+        <p:nvPicPr>
+          <p:cNvPr descr="main_files/figure-pptx/unnamed-chunk-16-1.png" id="0" name="Picture 1"/>
+          <p:cNvPicPr>
+            <a:picLocks noGrp="1" noChangeAspect="1"/>
+          </p:cNvPicPr>
+          <p:nvPr/>
+        </p:nvPicPr>
+        <p:blipFill>
+          <a:blip r:embed="rId2"/>
+          <a:stretch>
+            <a:fillRect/>
+          </a:stretch>
+        </p:blipFill>
+        <p:spPr bwMode="auto">
+          <a:xfrm>
+            <a:off x="3568700" y="685800"/>
+            <a:ext cx="5105400" cy="3403600"/>
+          </a:xfrm>
+          <a:prstGeom prst="rect">
+            <a:avLst/>
+          </a:prstGeom>
+          <a:noFill/>
+          <a:ln w="9525">
+            <a:noFill/>
+            <a:headEnd/>
+            <a:tailEnd/>
+          </a:ln>
+        </p:spPr>
+      </p:pic>
     </p:spTree>
   </p:cSld>
 </p:sld>
@@ -3811,14 +3925,14 @@
             </a:pPr>
             <a:r>
               <a:rPr/>
-              <a:t>Initial Data for Cases in Australia</a:t>
+              <a:t>Applying the day of flex indicator to the plot (Cases)</a:t>
             </a:r>
           </a:p>
         </p:txBody>
       </p:sp>
       <p:pic>
         <p:nvPicPr>
-          <p:cNvPr descr="main_files/figure-pptx/unnamed-chunk-15-1.png" id="0" name="Picture 1"/>
+          <p:cNvPr descr="main_files/figure-pptx/unnamed-chunk-17-1.png" id="0" name="Picture 1"/>
           <p:cNvPicPr>
             <a:picLocks noGrp="1" noChangeAspect="1"/>
           </p:cNvPicPr>
@@ -3888,14 +4002,14 @@
             </a:pPr>
             <a:r>
               <a:rPr/>
-              <a:t>Initial Data for Fatalities in Australia</a:t>
+              <a:t>Applying the day of flex indicator to the plot (Fatalities)</a:t>
             </a:r>
           </a:p>
         </p:txBody>
       </p:sp>
       <p:pic>
         <p:nvPicPr>
-          <p:cNvPr descr="main_files/figure-pptx/unnamed-chunk-16-1.png" id="0" name="Picture 1"/>
+          <p:cNvPr descr="main_files/figure-pptx/unnamed-chunk-19-1.png" id="0" name="Picture 1"/>
           <p:cNvPicPr>
             <a:picLocks noGrp="1" noChangeAspect="1"/>
           </p:cNvPicPr>
@@ -4041,7 +4155,12 @@
             <p:ph type="title"/>
           </p:nvPr>
         </p:nvSpPr>
-        <p:spPr/>
+        <p:spPr>
+          <a:xfrm>
+            <a:off x="722313" y="3305176"/>
+            <a:ext cx="7772400" cy="1021556"/>
+          </a:xfrm>
+        </p:spPr>
         <p:txBody>
           <a:bodyPr/>
           <a:lstStyle/>
@@ -4051,41 +4170,11 @@
             </a:pPr>
             <a:r>
               <a:rPr/>
-              <a:t>Fitting Gauss Error Function to Cases in Australia</a:t>
-            </a:r>
-          </a:p>
-        </p:txBody>
-      </p:sp>
-      <p:pic>
-        <p:nvPicPr>
-          <p:cNvPr descr="main_files/figure-pptx/unnamed-chunk-18-1.png" id="0" name="Picture 1"/>
-          <p:cNvPicPr>
-            <a:picLocks noGrp="1" noChangeAspect="1"/>
-          </p:cNvPicPr>
-          <p:nvPr/>
-        </p:nvPicPr>
-        <p:blipFill>
-          <a:blip r:embed="rId2"/>
-          <a:stretch>
-            <a:fillRect/>
-          </a:stretch>
-        </p:blipFill>
-        <p:spPr bwMode="auto">
-          <a:xfrm>
-            <a:off x="2032000" y="1193800"/>
-            <a:ext cx="5080000" cy="3390900"/>
-          </a:xfrm>
-          <a:prstGeom prst="rect">
-            <a:avLst/>
-          </a:prstGeom>
-          <a:noFill/>
-          <a:ln w="9525">
-            <a:noFill/>
-            <a:headEnd/>
-            <a:tailEnd/>
-          </a:ln>
-        </p:spPr>
-      </p:pic>
+              <a:t>Australia Simulation</a:t>
+            </a:r>
+          </a:p>
+        </p:txBody>
+      </p:sp>
     </p:spTree>
   </p:cSld>
 </p:sld>
@@ -4128,14 +4217,14 @@
             </a:pPr>
             <a:r>
               <a:rPr/>
-              <a:t>Fitting Gauss Error Function to Fatalities in Australia</a:t>
+              <a:t>Initial Data for Cases in Australia</a:t>
             </a:r>
           </a:p>
         </p:txBody>
       </p:sp>
       <p:pic>
         <p:nvPicPr>
-          <p:cNvPr descr="main_files/figure-pptx/unnamed-chunk-19-1.png" id="0" name="Picture 1"/>
+          <p:cNvPr descr="main_files/figure-pptx/unnamed-chunk-21-1.png" id="0" name="Picture 1"/>
           <p:cNvPicPr>
             <a:picLocks noGrp="1" noChangeAspect="1"/>
           </p:cNvPicPr>
@@ -4205,14 +4294,14 @@
             </a:pPr>
             <a:r>
               <a:rPr/>
-              <a:t>Applying the function to the whole cases dataset</a:t>
+              <a:t>Initial Data for Fatalities in Australia</a:t>
             </a:r>
           </a:p>
         </p:txBody>
       </p:sp>
       <p:pic>
         <p:nvPicPr>
-          <p:cNvPr descr="main_files/figure-pptx/unnamed-chunk-21-1.png" id="0" name="Picture 1"/>
+          <p:cNvPr descr="main_files/figure-pptx/unnamed-chunk-22-1.png" id="0" name="Picture 1"/>
           <p:cNvPicPr>
             <a:picLocks noGrp="1" noChangeAspect="1"/>
           </p:cNvPicPr>
@@ -4282,14 +4371,14 @@
             </a:pPr>
             <a:r>
               <a:rPr/>
-              <a:t>Applying the function to the whole fatalities dataset</a:t>
+              <a:t>Fitting Gauss Error Function to Cases in Australia</a:t>
             </a:r>
           </a:p>
         </p:txBody>
       </p:sp>
       <p:pic>
         <p:nvPicPr>
-          <p:cNvPr descr="main_files/figure-pptx/unnamed-chunk-22-1.png" id="0" name="Picture 1"/>
+          <p:cNvPr descr="main_files/figure-pptx/unnamed-chunk-24-1.png" id="0" name="Picture 1"/>
           <p:cNvPicPr>
             <a:picLocks noGrp="1" noChangeAspect="1"/>
           </p:cNvPicPr>
@@ -4359,41 +4448,41 @@
             </a:pPr>
             <a:r>
               <a:rPr/>
-              <a:t>Using MonteCarlo Simulation to predict the day of flex</a:t>
-            </a:r>
-          </a:p>
-        </p:txBody>
-      </p:sp>
-      <p:sp>
-        <p:nvSpPr>
-          <p:cNvPr id="3" name="Content Placeholder 2"/>
-          <p:cNvSpPr>
-            <a:spLocks noGrp="1"/>
-          </p:cNvSpPr>
-          <p:nvPr>
-            <p:ph idx="1"/>
-          </p:nvPr>
-        </p:nvSpPr>
-        <p:spPr/>
-        <p:txBody>
-          <a:bodyPr/>
-          <a:lstStyle/>
-          <a:p>
-            <a:pPr lvl="0"/>
-            <a:r>
-              <a:rPr/>
-              <a:t>The mean of the day of flex for cases is 60.22 days and the standard deviation is 0.77 days.</a:t>
-            </a:r>
-          </a:p>
-          <a:p>
-            <a:pPr lvl="0"/>
-            <a:r>
-              <a:rPr/>
-              <a:t>The mean of the day of flex for fatalities is 81.4 days and the standard deviation is 0.69 days.</a:t>
-            </a:r>
-          </a:p>
-        </p:txBody>
-      </p:sp>
+              <a:t>Fitting Gauss Error Function to Fatalities in Australia</a:t>
+            </a:r>
+          </a:p>
+        </p:txBody>
+      </p:sp>
+      <p:pic>
+        <p:nvPicPr>
+          <p:cNvPr descr="main_files/figure-pptx/unnamed-chunk-25-1.png" id="0" name="Picture 1"/>
+          <p:cNvPicPr>
+            <a:picLocks noGrp="1" noChangeAspect="1"/>
+          </p:cNvPicPr>
+          <p:nvPr/>
+        </p:nvPicPr>
+        <p:blipFill>
+          <a:blip r:embed="rId2"/>
+          <a:stretch>
+            <a:fillRect/>
+          </a:stretch>
+        </p:blipFill>
+        <p:spPr bwMode="auto">
+          <a:xfrm>
+            <a:off x="2032000" y="1193800"/>
+            <a:ext cx="5080000" cy="3390900"/>
+          </a:xfrm>
+          <a:prstGeom prst="rect">
+            <a:avLst/>
+          </a:prstGeom>
+          <a:noFill/>
+          <a:ln w="9525">
+            <a:noFill/>
+            <a:headEnd/>
+            <a:tailEnd/>
+          </a:ln>
+        </p:spPr>
+      </p:pic>
     </p:spTree>
   </p:cSld>
 </p:sld>
@@ -4436,14 +4525,14 @@
             </a:pPr>
             <a:r>
               <a:rPr/>
-              <a:t>Applying the day of flex indicator to the data (Cases)</a:t>
+              <a:t>Applying the function to the whole cases dataset</a:t>
             </a:r>
           </a:p>
         </p:txBody>
       </p:sp>
       <p:pic>
         <p:nvPicPr>
-          <p:cNvPr descr="main_files/figure-pptx/unnamed-chunk-26-1.png" id="0" name="Picture 1"/>
+          <p:cNvPr descr="main_files/figure-pptx/unnamed-chunk-27-1.png" id="0" name="Picture 1"/>
           <p:cNvPicPr>
             <a:picLocks noGrp="1" noChangeAspect="1"/>
           </p:cNvPicPr>
@@ -4513,14 +4602,14 @@
             </a:pPr>
             <a:r>
               <a:rPr/>
-              <a:t>Applying the day of flex indicator to the data (Fatalities)</a:t>
+              <a:t>Applying the function to the whole fatalities dataset</a:t>
             </a:r>
           </a:p>
         </p:txBody>
       </p:sp>
       <p:pic>
         <p:nvPicPr>
-          <p:cNvPr descr="main_files/figure-pptx/unnamed-chunk-27-1.png" id="0" name="Picture 1"/>
+          <p:cNvPr descr="main_files/figure-pptx/unnamed-chunk-28-1.png" id="0" name="Picture 1"/>
           <p:cNvPicPr>
             <a:picLocks noGrp="1" noChangeAspect="1"/>
           </p:cNvPicPr>
@@ -4590,7 +4679,7 @@
             </a:pPr>
             <a:r>
               <a:rPr/>
-              <a:t>Works Cited</a:t>
+              <a:t>Using MonteCarlo Simulation to predict the day of flex</a:t>
             </a:r>
           </a:p>
         </p:txBody>
@@ -4613,56 +4702,172 @@
             <a:pPr lvl="0"/>
             <a:r>
               <a:rPr/>
-              <a:t>Link to study:</a:t>
+              <a:t>The mean of the day of flex for cases is 60.22 days and the standard deviation is 0.77 days.</a:t>
             </a:r>
           </a:p>
           <a:p>
             <a:pPr lvl="0"/>
             <a:r>
               <a:rPr/>
-              <a:t>I. Ciufolini, A. Paolozzi, Prediction of the time evolution of the Covid-19 Pandemic in Italy by a Gauss Error Function and Monte Carlo simulations. Submitted to BioRxiv on 03.26.2020 and transferred on 03.27.2020 to MedRxiv. </a:t>
-            </a:r>
-            <a:r>
-              <a:rPr>
-                <a:hlinkClick r:id="rId2"/>
-              </a:rPr>
-              <a:t>https://doi.org/10.1101/2020.03.27.20045104</a:t>
-            </a:r>
-          </a:p>
-          <a:p>
-            <a:pPr lvl="0"/>
+              <a:t>The mean of the day of flex for fatalities is 81.4 days and the standard deviation is 0.69 days.</a:t>
+            </a:r>
+          </a:p>
+        </p:txBody>
+      </p:sp>
+    </p:spTree>
+  </p:cSld>
+</p:sld>
+</file>
+
+<file path=ppt/slides/slide28.xml><?xml version="1.0" encoding="utf-8"?>
+<p:sld xmlns:a="http://schemas.openxmlformats.org/drawingml/2006/main" xmlns:r="http://schemas.openxmlformats.org/officeDocument/2006/relationships" xmlns:p="http://schemas.openxmlformats.org/presentationml/2006/main">
+  <p:cSld>
+    <p:spTree>
+      <p:nvGrpSpPr>
+        <p:cNvPr id="1" name=""/>
+        <p:cNvGrpSpPr/>
+        <p:nvPr/>
+      </p:nvGrpSpPr>
+      <p:grpSpPr>
+        <a:xfrm>
+          <a:off x="0" y="0"/>
+          <a:ext cx="0" cy="0"/>
+          <a:chOff x="0" y="0"/>
+          <a:chExt cx="0" cy="0"/>
+        </a:xfrm>
+      </p:grpSpPr>
+      <p:sp>
+        <p:nvSpPr>
+          <p:cNvPr id="2" name="Title 1"/>
+          <p:cNvSpPr>
+            <a:spLocks noGrp="1"/>
+          </p:cNvSpPr>
+          <p:nvPr>
+            <p:ph type="title"/>
+          </p:nvPr>
+        </p:nvSpPr>
+        <p:spPr/>
+        <p:txBody>
+          <a:bodyPr/>
+          <a:lstStyle/>
+          <a:p>
+            <a:pPr lvl="0" indent="0" marL="0">
+              <a:buNone/>
+            </a:pPr>
             <a:r>
               <a:rPr/>
-              <a:t>Link to covid data:</a:t>
-            </a:r>
-          </a:p>
-          <a:p>
-            <a:pPr lvl="0"/>
-            <a:r>
-              <a:rPr>
-                <a:hlinkClick r:id="rId3"/>
-              </a:rPr>
-              <a:t>https://covid19.who.int/</a:t>
-            </a:r>
-          </a:p>
-          <a:p>
-            <a:pPr lvl="0"/>
+              <a:t>Applying the day of flex indicator to the data (Cases)</a:t>
+            </a:r>
+          </a:p>
+        </p:txBody>
+      </p:sp>
+      <p:pic>
+        <p:nvPicPr>
+          <p:cNvPr descr="main_files/figure-pptx/unnamed-chunk-32-1.png" id="0" name="Picture 1"/>
+          <p:cNvPicPr>
+            <a:picLocks noGrp="1" noChangeAspect="1"/>
+          </p:cNvPicPr>
+          <p:nvPr/>
+        </p:nvPicPr>
+        <p:blipFill>
+          <a:blip r:embed="rId2"/>
+          <a:stretch>
+            <a:fillRect/>
+          </a:stretch>
+        </p:blipFill>
+        <p:spPr bwMode="auto">
+          <a:xfrm>
+            <a:off x="2032000" y="1193800"/>
+            <a:ext cx="5080000" cy="3390900"/>
+          </a:xfrm>
+          <a:prstGeom prst="rect">
+            <a:avLst/>
+          </a:prstGeom>
+          <a:noFill/>
+          <a:ln w="9525">
+            <a:noFill/>
+            <a:headEnd/>
+            <a:tailEnd/>
+          </a:ln>
+        </p:spPr>
+      </p:pic>
+    </p:spTree>
+  </p:cSld>
+</p:sld>
+</file>
+
+<file path=ppt/slides/slide29.xml><?xml version="1.0" encoding="utf-8"?>
+<p:sld xmlns:a="http://schemas.openxmlformats.org/drawingml/2006/main" xmlns:r="http://schemas.openxmlformats.org/officeDocument/2006/relationships" xmlns:p="http://schemas.openxmlformats.org/presentationml/2006/main">
+  <p:cSld>
+    <p:spTree>
+      <p:nvGrpSpPr>
+        <p:cNvPr id="1" name=""/>
+        <p:cNvGrpSpPr/>
+        <p:nvPr/>
+      </p:nvGrpSpPr>
+      <p:grpSpPr>
+        <a:xfrm>
+          <a:off x="0" y="0"/>
+          <a:ext cx="0" cy="0"/>
+          <a:chOff x="0" y="0"/>
+          <a:chExt cx="0" cy="0"/>
+        </a:xfrm>
+      </p:grpSpPr>
+      <p:sp>
+        <p:nvSpPr>
+          <p:cNvPr id="2" name="Title 1"/>
+          <p:cNvSpPr>
+            <a:spLocks noGrp="1"/>
+          </p:cNvSpPr>
+          <p:nvPr>
+            <p:ph type="title"/>
+          </p:nvPr>
+        </p:nvSpPr>
+        <p:spPr/>
+        <p:txBody>
+          <a:bodyPr/>
+          <a:lstStyle/>
+          <a:p>
+            <a:pPr lvl="0" indent="0" marL="0">
+              <a:buNone/>
+            </a:pPr>
             <a:r>
               <a:rPr/>
-              <a:t>source to find the second derivative of fitted function:</a:t>
-            </a:r>
-          </a:p>
-          <a:p>
-            <a:pPr lvl="0"/>
-            <a:r>
-              <a:rPr>
-                <a:hlinkClick r:id="rId4"/>
-              </a:rPr>
-              <a:t>https://proofwiki.org/wiki/Derivative_of_Error_Function</a:t>
-            </a:r>
-          </a:p>
-        </p:txBody>
-      </p:sp>
+              <a:t>Applying the day of flex indicator to the data (Fatalities)</a:t>
+            </a:r>
+          </a:p>
+        </p:txBody>
+      </p:sp>
+      <p:pic>
+        <p:nvPicPr>
+          <p:cNvPr descr="main_files/figure-pptx/unnamed-chunk-33-1.png" id="0" name="Picture 1"/>
+          <p:cNvPicPr>
+            <a:picLocks noGrp="1" noChangeAspect="1"/>
+          </p:cNvPicPr>
+          <p:nvPr/>
+        </p:nvPicPr>
+        <p:blipFill>
+          <a:blip r:embed="rId2"/>
+          <a:stretch>
+            <a:fillRect/>
+          </a:stretch>
+        </p:blipFill>
+        <p:spPr bwMode="auto">
+          <a:xfrm>
+            <a:off x="2032000" y="1193800"/>
+            <a:ext cx="5080000" cy="3390900"/>
+          </a:xfrm>
+          <a:prstGeom prst="rect">
+            <a:avLst/>
+          </a:prstGeom>
+          <a:noFill/>
+          <a:ln w="9525">
+            <a:noFill/>
+            <a:headEnd/>
+            <a:tailEnd/>
+          </a:ln>
+        </p:spPr>
+      </p:pic>
     </p:spTree>
   </p:cSld>
 </p:sld>
@@ -4710,97 +4915,6 @@
           </a:p>
         </p:txBody>
       </p:sp>
-      <p:sp>
-        <p:nvSpPr>
-          <p:cNvPr id="3" name="Content Placeholder 2"/>
-          <p:cNvSpPr>
-            <a:spLocks noGrp="1"/>
-          </p:cNvSpPr>
-          <p:nvPr>
-            <p:ph idx="1"/>
-          </p:nvPr>
-        </p:nvSpPr>
-        <p:spPr/>
-        <p:txBody>
-          <a:bodyPr/>
-          <a:lstStyle/>
-          <a:p>
-            <a:pPr lvl="0"/>
-            <a:r>
-              <a:rPr/>
-              <a:t>In this study by Ignazio Ciufolini and Antonio Paolozzi, they use a Gauss Error function that approximates the distribution of the cumulative positive cases of COVID-19 in China</a:t>
-            </a:r>
-          </a:p>
-          <a:p>
-            <a:pPr lvl="1"/>
-            <a:r>
-              <a:rPr/>
-              <a:t>They have then use the function to approximate the number of cumulative positive cases in Italy</a:t>
-            </a:r>
-          </a:p>
-          <a:p>
-            <a:pPr lvl="1"/>
-            <a:r>
-              <a:rPr/>
-              <a:t>Then performed a 150 Monte Carlo simulations to predict the peak and valley of the number of daily positive cases and fatalities</a:t>
-            </a:r>
-          </a:p>
-          <a:p>
-            <a:pPr lvl="0"/>
-            <a:r>
-              <a:rPr/>
-              <a:t>This study do not take into account factors such as daily nasopharyngeal swabs, medical, social distancing, etc.</a:t>
-            </a:r>
-          </a:p>
-        </p:txBody>
-      </p:sp>
-    </p:spTree>
-  </p:cSld>
-</p:sld>
-</file>
-
-<file path=ppt/slides/slide4.xml><?xml version="1.0" encoding="utf-8"?>
-<p:sld xmlns:a="http://schemas.openxmlformats.org/drawingml/2006/main" xmlns:r="http://schemas.openxmlformats.org/officeDocument/2006/relationships" xmlns:p="http://schemas.openxmlformats.org/presentationml/2006/main">
-  <p:cSld>
-    <p:spTree>
-      <p:nvGrpSpPr>
-        <p:cNvPr id="1" name=""/>
-        <p:cNvGrpSpPr/>
-        <p:nvPr/>
-      </p:nvGrpSpPr>
-      <p:grpSpPr>
-        <a:xfrm>
-          <a:off x="0" y="0"/>
-          <a:ext cx="0" cy="0"/>
-          <a:chOff x="0" y="0"/>
-          <a:chExt cx="0" cy="0"/>
-        </a:xfrm>
-      </p:grpSpPr>
-      <p:sp>
-        <p:nvSpPr>
-          <p:cNvPr id="2" name="Title 1"/>
-          <p:cNvSpPr>
-            <a:spLocks noGrp="1"/>
-          </p:cNvSpPr>
-          <p:nvPr>
-            <p:ph type="title"/>
-          </p:nvPr>
-        </p:nvSpPr>
-        <p:spPr/>
-        <p:txBody>
-          <a:bodyPr/>
-          <a:lstStyle/>
-          <a:p>
-            <a:pPr lvl="0" indent="0" marL="0">
-              <a:buNone/>
-            </a:pPr>
-            <a:r>
-              <a:rPr/>
-              <a:t>Cont.</a:t>
-            </a:r>
-          </a:p>
-        </p:txBody>
-      </p:sp>
       <mc:AlternateContent xmlns:mc="http://schemas.openxmlformats.org/markup-compatibility/2006">
         <mc:Choice xmlns:a14="http://schemas.microsoft.com/office/drawing/2010/main" Requires="a14">
           <p:sp>
@@ -4821,7 +4935,7 @@
                 <a:pPr lvl="0"/>
                 <a:r>
                   <a:rPr/>
-                  <a:t>The number of cumulative diagnosed positive cases and fatalities in China approximates a gauss error function: </a:t>
+                  <a:t>The time evolution of he number of cumulative diagnosed positive cases and fatalities in China approximates the distribution of a gauss error function: </a:t>
                 </a:r>
                 <a14:m>
                   <m:oMath xmlns:m="http://schemas.openxmlformats.org/officeDocument/2006/math">
@@ -4894,14 +5008,14 @@
                 <a:pPr lvl="0"/>
                 <a:r>
                   <a:rPr/>
-                  <a:t>Predicted the potential number of cases in Italy.</a:t>
+                  <a:t>Performed the function on Italy data to approximate the number of cases.</a:t>
                 </a:r>
               </a:p>
               <a:p>
                 <a:pPr lvl="0"/>
                 <a:r>
                   <a:rPr/>
-                  <a:t>Predicted the day in which the peak of the number of daily cases in Italy occurs.</a:t>
+                  <a:t>Performed 150 Monte Carlo simulations to predict the day in which the peak of the number of daily cases in Italy occurs.</a:t>
                 </a:r>
               </a:p>
             </p:txBody>
@@ -4913,7 +5027,7 @@
 </p:sld>
 </file>
 
-<file path=ppt/slides/slide5.xml><?xml version="1.0" encoding="utf-8"?>
+<file path=ppt/slides/slide30.xml><?xml version="1.0" encoding="utf-8"?>
 <p:sld xmlns:a="http://schemas.openxmlformats.org/drawingml/2006/main" xmlns:r="http://schemas.openxmlformats.org/officeDocument/2006/relationships" xmlns:p="http://schemas.openxmlformats.org/presentationml/2006/main">
   <p:cSld>
     <p:spTree>
@@ -4950,7 +5064,7 @@
             </a:pPr>
             <a:r>
               <a:rPr/>
-              <a:t>Overview of the Monte Carlo Simulation</a:t>
+              <a:t>Works Cited</a:t>
             </a:r>
           </a:p>
         </p:txBody>
@@ -4973,78 +5087,52 @@
             <a:pPr lvl="0"/>
             <a:r>
               <a:rPr/>
-              <a:t>create a random matrix : m X n</a:t>
-            </a:r>
-          </a:p>
-          <a:p>
-            <a:pPr lvl="1"/>
+              <a:t>Link to study:</a:t>
+            </a:r>
+          </a:p>
+          <a:p>
+            <a:pPr lvl="0"/>
             <a:r>
               <a:rPr/>
-              <a:t>m = number of random outcomes (</a:t>
-            </a:r>
-            <a:r>
-              <a:rPr i="1"/>
-              <a:t>chosen to be 150</a:t>
-            </a:r>
+              <a:t>I. Ciufolini, A. Paolozzi, Prediction of the time evolution of the Covid-19 Pandemic in Italy by a Gauss Error Function and Monte Carlo simulations. Submitted to BioRxiv on 03.26.2020 and transferred on 03.27.2020 to MedRxiv. </a:t>
+            </a:r>
+            <a:r>
+              <a:rPr>
+                <a:hlinkClick r:id="rId2"/>
+              </a:rPr>
+              <a:t>https://doi.org/10.1101/2020.03.27.20045104</a:t>
+            </a:r>
+          </a:p>
+          <a:p>
+            <a:pPr lvl="0"/>
             <a:r>
               <a:rPr/>
-              <a:t>)</a:t>
-            </a:r>
-          </a:p>
-          <a:p>
-            <a:pPr lvl="1"/>
+              <a:t>Link to covid data:</a:t>
+            </a:r>
+          </a:p>
+          <a:p>
+            <a:pPr lvl="0"/>
+            <a:r>
+              <a:rPr>
+                <a:hlinkClick r:id="rId3"/>
+              </a:rPr>
+              <a:t>https://covid19.who.int/</a:t>
+            </a:r>
+          </a:p>
+          <a:p>
+            <a:pPr lvl="0"/>
             <a:r>
               <a:rPr/>
-              <a:t>n = number of observed days (</a:t>
-            </a:r>
-            <a:r>
-              <a:rPr i="1"/>
-              <a:t>n = 1,…,j</a:t>
-            </a:r>
-            <a:r>
-              <a:rPr/>
-              <a:t>)</a:t>
+              <a:t>source to find the second derivative of fitted function:</a:t>
             </a:r>
           </a:p>
           <a:p>
             <a:pPr lvl="0"/>
             <a:r>
-              <a:rPr/>
-              <a:t>each # in the matrix is a Gaussian distribution with mean = 1 and sigma = 0.1</a:t>
-            </a:r>
-          </a:p>
-          <a:p>
-            <a:pPr lvl="1"/>
-            <a:r>
-              <a:rPr/>
-              <a:t>multiply each column (</a:t>
-            </a:r>
-            <a:r>
-              <a:rPr i="1"/>
-              <a:t>j</a:t>
-            </a:r>
-            <a:r>
-              <a:rPr/>
-              <a:t>) by the # of total cases (or deaths) that corresponds to each day </a:t>
-            </a:r>
-            <a:r>
-              <a:rPr i="1"/>
-              <a:t>j</a:t>
-            </a:r>
-            <a:r>
-              <a:rPr/>
-              <a:t> </a:t>
-            </a:r>
-            <a:r>
-              <a:rPr b="1"/>
-              <a:t>#FIXME#</a:t>
-            </a:r>
-          </a:p>
-          <a:p>
-            <a:pPr lvl="0"/>
-            <a:r>
-              <a:rPr/>
-              <a:t>add more…</a:t>
+              <a:rPr>
+                <a:hlinkClick r:id="rId4"/>
+              </a:rPr>
+              <a:t>https://proofwiki.org/wiki/Derivative_of_Error_Function</a:t>
             </a:r>
           </a:p>
         </p:txBody>
@@ -5054,7 +5142,7 @@
 </p:sld>
 </file>
 
-<file path=ppt/slides/slide6.xml><?xml version="1.0" encoding="utf-8"?>
+<file path=ppt/slides/slide4.xml><?xml version="1.0" encoding="utf-8"?>
 <p:sld xmlns:a="http://schemas.openxmlformats.org/drawingml/2006/main" xmlns:r="http://schemas.openxmlformats.org/officeDocument/2006/relationships" xmlns:p="http://schemas.openxmlformats.org/presentationml/2006/main">
   <p:cSld>
     <p:spTree>
@@ -5106,7 +5194,7 @@
 </p:sld>
 </file>
 
-<file path=ppt/slides/slide7.xml><?xml version="1.0" encoding="utf-8"?>
+<file path=ppt/slides/slide5.xml><?xml version="1.0" encoding="utf-8"?>
 <p:sld xmlns:a="http://schemas.openxmlformats.org/drawingml/2006/main" xmlns:r="http://schemas.openxmlformats.org/officeDocument/2006/relationships" xmlns:p="http://schemas.openxmlformats.org/presentationml/2006/main">
   <p:cSld>
     <p:spTree>
@@ -5183,7 +5271,7 @@
 </p:sld>
 </file>
 
-<file path=ppt/slides/slide8.xml><?xml version="1.0" encoding="utf-8"?>
+<file path=ppt/slides/slide6.xml><?xml version="1.0" encoding="utf-8"?>
 <p:sld xmlns:a="http://schemas.openxmlformats.org/drawingml/2006/main" xmlns:r="http://schemas.openxmlformats.org/officeDocument/2006/relationships" xmlns:p="http://schemas.openxmlformats.org/presentationml/2006/main">
   <p:cSld>
     <p:spTree>
@@ -5260,7 +5348,7 @@
 </p:sld>
 </file>
 
-<file path=ppt/slides/slide9.xml><?xml version="1.0" encoding="utf-8"?>
+<file path=ppt/slides/slide7.xml><?xml version="1.0" encoding="utf-8"?>
 <p:sld xmlns:a="http://schemas.openxmlformats.org/drawingml/2006/main" xmlns:r="http://schemas.openxmlformats.org/officeDocument/2006/relationships" xmlns:p="http://schemas.openxmlformats.org/presentationml/2006/main">
   <p:cSld>
     <p:spTree>
@@ -5672,6 +5760,160 @@
           </p:sp>
         </mc:Choice>
       </mc:AlternateContent>
+    </p:spTree>
+  </p:cSld>
+</p:sld>
+</file>
+
+<file path=ppt/slides/slide8.xml><?xml version="1.0" encoding="utf-8"?>
+<p:sld xmlns:a="http://schemas.openxmlformats.org/drawingml/2006/main" xmlns:r="http://schemas.openxmlformats.org/officeDocument/2006/relationships" xmlns:p="http://schemas.openxmlformats.org/presentationml/2006/main">
+  <p:cSld>
+    <p:spTree>
+      <p:nvGrpSpPr>
+        <p:cNvPr id="1" name=""/>
+        <p:cNvGrpSpPr/>
+        <p:nvPr/>
+      </p:nvGrpSpPr>
+      <p:grpSpPr>
+        <a:xfrm>
+          <a:off x="0" y="0"/>
+          <a:ext cx="0" cy="0"/>
+          <a:chOff x="0" y="0"/>
+          <a:chExt cx="0" cy="0"/>
+        </a:xfrm>
+      </p:grpSpPr>
+      <p:sp>
+        <p:nvSpPr>
+          <p:cNvPr id="2" name="Title 1"/>
+          <p:cNvSpPr>
+            <a:spLocks noGrp="1"/>
+          </p:cNvSpPr>
+          <p:nvPr>
+            <p:ph type="title"/>
+          </p:nvPr>
+        </p:nvSpPr>
+        <p:spPr/>
+        <p:txBody>
+          <a:bodyPr/>
+          <a:lstStyle/>
+          <a:p>
+            <a:pPr lvl="0" indent="0" marL="0">
+              <a:buNone/>
+            </a:pPr>
+            <a:r>
+              <a:rPr/>
+              <a:t>Fit by the Gauss Error Function and Peak Day (Positive Cases)</a:t>
+            </a:r>
+          </a:p>
+        </p:txBody>
+      </p:sp>
+      <p:pic>
+        <p:nvPicPr>
+          <p:cNvPr descr="main_files/figure-pptx/unnamed-chunk-7-1.png" id="0" name="Picture 1"/>
+          <p:cNvPicPr>
+            <a:picLocks noGrp="1" noChangeAspect="1"/>
+          </p:cNvPicPr>
+          <p:nvPr/>
+        </p:nvPicPr>
+        <p:blipFill>
+          <a:blip r:embed="rId2"/>
+          <a:stretch>
+            <a:fillRect/>
+          </a:stretch>
+        </p:blipFill>
+        <p:spPr bwMode="auto">
+          <a:xfrm>
+            <a:off x="2032000" y="1193800"/>
+            <a:ext cx="5080000" cy="3390900"/>
+          </a:xfrm>
+          <a:prstGeom prst="rect">
+            <a:avLst/>
+          </a:prstGeom>
+          <a:noFill/>
+          <a:ln w="9525">
+            <a:noFill/>
+            <a:headEnd/>
+            <a:tailEnd/>
+          </a:ln>
+        </p:spPr>
+      </p:pic>
+    </p:spTree>
+  </p:cSld>
+</p:sld>
+</file>
+
+<file path=ppt/slides/slide9.xml><?xml version="1.0" encoding="utf-8"?>
+<p:sld xmlns:a="http://schemas.openxmlformats.org/drawingml/2006/main" xmlns:r="http://schemas.openxmlformats.org/officeDocument/2006/relationships" xmlns:p="http://schemas.openxmlformats.org/presentationml/2006/main">
+  <p:cSld>
+    <p:spTree>
+      <p:nvGrpSpPr>
+        <p:cNvPr id="1" name=""/>
+        <p:cNvGrpSpPr/>
+        <p:nvPr/>
+      </p:nvGrpSpPr>
+      <p:grpSpPr>
+        <a:xfrm>
+          <a:off x="0" y="0"/>
+          <a:ext cx="0" cy="0"/>
+          <a:chOff x="0" y="0"/>
+          <a:chExt cx="0" cy="0"/>
+        </a:xfrm>
+      </p:grpSpPr>
+      <p:sp>
+        <p:nvSpPr>
+          <p:cNvPr id="2" name="Title 1"/>
+          <p:cNvSpPr>
+            <a:spLocks noGrp="1"/>
+          </p:cNvSpPr>
+          <p:nvPr>
+            <p:ph type="title"/>
+          </p:nvPr>
+        </p:nvSpPr>
+        <p:spPr/>
+        <p:txBody>
+          <a:bodyPr/>
+          <a:lstStyle/>
+          <a:p>
+            <a:pPr lvl="0" indent="0" marL="0">
+              <a:buNone/>
+            </a:pPr>
+            <a:r>
+              <a:rPr/>
+              <a:t>Fit by the Gauss Error Function and Peak Day (Fatalities)</a:t>
+            </a:r>
+          </a:p>
+        </p:txBody>
+      </p:sp>
+      <p:pic>
+        <p:nvPicPr>
+          <p:cNvPr descr="main_files/figure-pptx/unnamed-chunk-9-1.png" id="0" name="Picture 1"/>
+          <p:cNvPicPr>
+            <a:picLocks noGrp="1" noChangeAspect="1"/>
+          </p:cNvPicPr>
+          <p:nvPr/>
+        </p:nvPicPr>
+        <p:blipFill>
+          <a:blip r:embed="rId2"/>
+          <a:stretch>
+            <a:fillRect/>
+          </a:stretch>
+        </p:blipFill>
+        <p:spPr bwMode="auto">
+          <a:xfrm>
+            <a:off x="2032000" y="1193800"/>
+            <a:ext cx="5080000" cy="3390900"/>
+          </a:xfrm>
+          <a:prstGeom prst="rect">
+            <a:avLst/>
+          </a:prstGeom>
+          <a:noFill/>
+          <a:ln w="9525">
+            <a:noFill/>
+            <a:headEnd/>
+            <a:tailEnd/>
+          </a:ln>
+        </p:spPr>
+      </p:pic>
     </p:spTree>
   </p:cSld>
 </p:sld>

</xml_diff>